<commit_message>
Revert "Merge branch 'main' of https://github.com/xogml01074/Final-Project"
This reverts commit db3628d985c65e5870ae960adbcc0d3ba800c5a2, reversing
changes made to 85f456349f28a589054f6d5b8596a46b1db3c4a8.
</commit_message>
<xml_diff>
--- a/최종 프로젝트(좀비 서바이벌).pptx
+++ b/최종 프로젝트(좀비 서바이벌).pptx
@@ -14,9 +14,8 @@
     <p:sldId id="259" r:id="rId8"/>
     <p:sldId id="260" r:id="rId9"/>
     <p:sldId id="262" r:id="rId10"/>
-    <p:sldId id="266" r:id="rId11"/>
-    <p:sldId id="263" r:id="rId12"/>
-    <p:sldId id="261" r:id="rId13"/>
+    <p:sldId id="263" r:id="rId11"/>
+    <p:sldId id="261" r:id="rId12"/>
   </p:sldIdLst>
   <p:sldSz cx="12192000" cy="6858000"/>
   <p:notesSz cx="6858000" cy="9144000"/>
@@ -276,7 +275,7 @@
           <a:p>
             <a:fld id="{A8224893-DBDA-4BFA-9CE1-4BFE7CD0F8CF}" type="datetime1">
               <a:rPr lang="en-US" smtClean="0"/>
-              <a:t>1/15/2024</a:t>
+              <a:t>1/12/2024</a:t>
             </a:fld>
             <a:endParaRPr lang="en-US"/>
           </a:p>
@@ -446,7 +445,7 @@
           <a:p>
             <a:fld id="{5F4E5243-F52A-4D37-9694-EB26C6C31910}" type="datetime1">
               <a:rPr lang="en-US" smtClean="0"/>
-              <a:t>1/15/2024</a:t>
+              <a:t>1/12/2024</a:t>
             </a:fld>
             <a:endParaRPr lang="en-US"/>
           </a:p>
@@ -626,7 +625,7 @@
           <a:p>
             <a:fld id="{3A77B6E1-634A-48DC-9E8B-D894023267EF}" type="datetime1">
               <a:rPr lang="en-US" smtClean="0"/>
-              <a:t>1/15/2024</a:t>
+              <a:t>1/12/2024</a:t>
             </a:fld>
             <a:endParaRPr lang="en-US"/>
           </a:p>
@@ -1441,7 +1440,7 @@
           <a:p>
             <a:fld id="{A8224893-DBDA-4BFA-9CE1-4BFE7CD0F8CF}" type="datetime1">
               <a:rPr lang="en-US" smtClean="0"/>
-              <a:t>1/15/2024</a:t>
+              <a:t>1/12/2024</a:t>
             </a:fld>
             <a:endParaRPr lang="en-US"/>
           </a:p>
@@ -1878,7 +1877,7 @@
           <a:p>
             <a:fld id="{7B2D3E9E-A95C-48F2-B4BF-A71542E0BE9A}" type="datetime1">
               <a:rPr lang="en-US" smtClean="0"/>
-              <a:t>1/15/2024</a:t>
+              <a:t>1/12/2024</a:t>
             </a:fld>
             <a:endParaRPr lang="en-US"/>
           </a:p>
@@ -2400,7 +2399,7 @@
           <a:p>
             <a:fld id="{A50F84E2-2D7A-43CF-AC90-352A289A783A}" type="datetime1">
               <a:rPr lang="en-US" smtClean="0"/>
-              <a:t>1/15/2024</a:t>
+              <a:t>1/12/2024</a:t>
             </a:fld>
             <a:endParaRPr lang="en-US"/>
           </a:p>
@@ -2837,7 +2836,7 @@
           <a:p>
             <a:fld id="{F12952B5-7A2F-4CC8-B7CE-9234E21C2837}" type="datetime1">
               <a:rPr lang="en-US" smtClean="0"/>
-              <a:t>1/15/2024</a:t>
+              <a:t>1/12/2024</a:t>
             </a:fld>
             <a:endParaRPr lang="en-US"/>
           </a:p>
@@ -3531,7 +3530,7 @@
           <a:p>
             <a:fld id="{CE1DA07A-9201-4B4B-BAF2-015AFA30F520}" type="datetime1">
               <a:rPr lang="en-US" smtClean="0"/>
-              <a:t>1/15/2024</a:t>
+              <a:t>1/12/2024</a:t>
             </a:fld>
             <a:endParaRPr lang="en-US"/>
           </a:p>
@@ -3870,7 +3869,7 @@
           <a:p>
             <a:fld id="{73D7E00A-486F-4252-8B1D-E32645521F49}" type="datetime1">
               <a:rPr lang="en-US" smtClean="0"/>
-              <a:t>1/15/2024</a:t>
+              <a:t>1/12/2024</a:t>
             </a:fld>
             <a:endParaRPr lang="en-US"/>
           </a:p>
@@ -4149,7 +4148,7 @@
           <a:p>
             <a:fld id="{8DDF5F92-E675-4B36-9A60-69A962A68675}" type="datetime1">
               <a:rPr lang="en-US" smtClean="0"/>
-              <a:t>1/15/2024</a:t>
+              <a:t>1/12/2024</a:t>
             </a:fld>
             <a:endParaRPr lang="en-US"/>
           </a:p>
@@ -4801,7 +4800,7 @@
           <a:p>
             <a:fld id="{AF6E2C9B-5FA2-460D-9BE7-B0812FC2A6FF}" type="datetime1">
               <a:rPr lang="en-US" smtClean="0"/>
-              <a:t>1/15/2024</a:t>
+              <a:t>1/12/2024</a:t>
             </a:fld>
             <a:endParaRPr lang="en-US"/>
           </a:p>
@@ -5120,7 +5119,7 @@
           <a:p>
             <a:fld id="{7B2D3E9E-A95C-48F2-B4BF-A71542E0BE9A}" type="datetime1">
               <a:rPr lang="en-US" smtClean="0"/>
-              <a:t>1/15/2024</a:t>
+              <a:t>1/12/2024</a:t>
             </a:fld>
             <a:endParaRPr lang="en-US"/>
           </a:p>
@@ -5396,7 +5395,7 @@
           <a:p>
             <a:fld id="{1D374940-A916-4C8B-9648-02A2D3898F9E}" type="datetime1">
               <a:rPr lang="en-US" smtClean="0"/>
-              <a:t>1/15/2024</a:t>
+              <a:t>1/12/2024</a:t>
             </a:fld>
             <a:endParaRPr lang="en-US"/>
           </a:p>
@@ -5668,7 +5667,7 @@
           <a:p>
             <a:fld id="{5F4E5243-F52A-4D37-9694-EB26C6C31910}" type="datetime1">
               <a:rPr lang="en-US" smtClean="0"/>
-              <a:t>1/15/2024</a:t>
+              <a:t>1/12/2024</a:t>
             </a:fld>
             <a:endParaRPr lang="en-US"/>
           </a:p>
@@ -6719,7 +6718,7 @@
           <a:p>
             <a:fld id="{3A77B6E1-634A-48DC-9E8B-D894023267EF}" type="datetime1">
               <a:rPr lang="en-US" smtClean="0"/>
-              <a:t>1/15/2024</a:t>
+              <a:t>1/12/2024</a:t>
             </a:fld>
             <a:endParaRPr lang="en-US"/>
           </a:p>
@@ -6980,7 +6979,7 @@
           <a:p>
             <a:fld id="{A50F84E2-2D7A-43CF-AC90-352A289A783A}" type="datetime1">
               <a:rPr lang="en-US" smtClean="0"/>
-              <a:t>1/15/2024</a:t>
+              <a:t>1/12/2024</a:t>
             </a:fld>
             <a:endParaRPr lang="en-US"/>
           </a:p>
@@ -7212,7 +7211,7 @@
           <a:p>
             <a:fld id="{F12952B5-7A2F-4CC8-B7CE-9234E21C2837}" type="datetime1">
               <a:rPr lang="en-US" smtClean="0"/>
-              <a:t>1/15/2024</a:t>
+              <a:t>1/12/2024</a:t>
             </a:fld>
             <a:endParaRPr lang="en-US"/>
           </a:p>
@@ -7554,7 +7553,7 @@
           <a:p>
             <a:fld id="{CE1DA07A-9201-4B4B-BAF2-015AFA30F520}" type="datetime1">
               <a:rPr lang="en-US" smtClean="0"/>
-              <a:t>1/15/2024</a:t>
+              <a:t>1/12/2024</a:t>
             </a:fld>
             <a:endParaRPr lang="en-US"/>
           </a:p>
@@ -7667,7 +7666,7 @@
           <a:p>
             <a:fld id="{73D7E00A-486F-4252-8B1D-E32645521F49}" type="datetime1">
               <a:rPr lang="en-US" smtClean="0"/>
-              <a:t>1/15/2024</a:t>
+              <a:t>1/12/2024</a:t>
             </a:fld>
             <a:endParaRPr lang="en-US"/>
           </a:p>
@@ -7785,7 +7784,7 @@
           <a:p>
             <a:fld id="{8DDF5F92-E675-4B36-9A60-69A962A68675}" type="datetime1">
               <a:rPr lang="en-US" smtClean="0"/>
-              <a:t>1/15/2024</a:t>
+              <a:t>1/12/2024</a:t>
             </a:fld>
             <a:endParaRPr lang="en-US"/>
           </a:p>
@@ -8069,7 +8068,7 @@
           <a:p>
             <a:fld id="{AF6E2C9B-5FA2-460D-9BE7-B0812FC2A6FF}" type="datetime1">
               <a:rPr lang="en-US" smtClean="0"/>
-              <a:t>1/15/2024</a:t>
+              <a:t>1/12/2024</a:t>
             </a:fld>
             <a:endParaRPr lang="en-US"/>
           </a:p>
@@ -8333,7 +8332,7 @@
           <a:p>
             <a:fld id="{1D374940-A916-4C8B-9648-02A2D3898F9E}" type="datetime1">
               <a:rPr lang="en-US" smtClean="0"/>
-              <a:t>1/15/2024</a:t>
+              <a:t>1/12/2024</a:t>
             </a:fld>
             <a:endParaRPr lang="en-US"/>
           </a:p>
@@ -8547,7 +8546,7 @@
           <a:p>
             <a:fld id="{5586B75A-687E-405C-8A0B-8D00578BA2C3}" type="datetime1">
               <a:rPr lang="en-US" smtClean="0"/>
-              <a:t>1/15/2024</a:t>
+              <a:t>1/12/2024</a:t>
             </a:fld>
             <a:endParaRPr lang="en-US"/>
           </a:p>
@@ -13061,7 +13060,7 @@
           <a:p>
             <a:fld id="{5586B75A-687E-405C-8A0B-8D00578BA2C3}" type="datetime1">
               <a:rPr lang="en-US" smtClean="0"/>
-              <a:t>1/15/2024</a:t>
+              <a:t>1/12/2024</a:t>
             </a:fld>
             <a:endParaRPr lang="en-US"/>
           </a:p>
@@ -13674,131 +13673,6 @@
             <a:spLocks noGrp="1"/>
           </p:cNvSpPr>
           <p:nvPr>
-            <p:ph type="title"/>
-          </p:nvPr>
-        </p:nvSpPr>
-        <p:spPr/>
-        <p:txBody>
-          <a:bodyPr>
-            <a:normAutofit/>
-          </a:bodyPr>
-          <a:lstStyle/>
-          <a:p>
-            <a:r>
-              <a:rPr lang="ko-KR" altLang="en-US" sz="3200" b="1" dirty="0" smtClean="0">
-                <a:solidFill>
-                  <a:schemeClr val="tx2"/>
-                </a:solidFill>
-                <a:latin typeface="+mj-ea"/>
-              </a:rPr>
-              <a:t>만드는데 겪었던 어려움</a:t>
-            </a:r>
-            <a:r>
-              <a:rPr lang="en-US" altLang="ko-KR" sz="3200" b="1" dirty="0" smtClean="0">
-                <a:solidFill>
-                  <a:schemeClr val="tx2"/>
-                </a:solidFill>
-                <a:latin typeface="+mj-ea"/>
-              </a:rPr>
-              <a:t>, </a:t>
-            </a:r>
-            <a:r>
-              <a:rPr lang="ko-KR" altLang="en-US" sz="3200" b="1" dirty="0" smtClean="0">
-                <a:solidFill>
-                  <a:schemeClr val="tx2"/>
-                </a:solidFill>
-                <a:latin typeface="+mj-ea"/>
-              </a:rPr>
-              <a:t>해결 방법</a:t>
-            </a:r>
-            <a:endParaRPr lang="ko-KR" altLang="en-US" sz="3200" b="1" dirty="0">
-              <a:solidFill>
-                <a:schemeClr val="tx2"/>
-              </a:solidFill>
-              <a:latin typeface="+mj-ea"/>
-            </a:endParaRPr>
-          </a:p>
-        </p:txBody>
-      </p:sp>
-      <p:sp>
-        <p:nvSpPr>
-          <p:cNvPr id="4" name="내용 개체 틀 3"/>
-          <p:cNvSpPr>
-            <a:spLocks noGrp="1"/>
-          </p:cNvSpPr>
-          <p:nvPr>
-            <p:ph idx="1"/>
-          </p:nvPr>
-        </p:nvSpPr>
-        <p:spPr/>
-        <p:txBody>
-          <a:bodyPr>
-            <a:normAutofit/>
-          </a:bodyPr>
-          <a:lstStyle/>
-          <a:p>
-            <a:r>
-              <a:rPr lang="ko-KR" altLang="en-US" sz="2400" dirty="0" smtClean="0"/>
-              <a:t>네트워크 관련</a:t>
-            </a:r>
-            <a:endParaRPr lang="en-US" altLang="ko-KR" sz="2400" dirty="0" smtClean="0"/>
-          </a:p>
-          <a:p>
-            <a:r>
-              <a:rPr lang="ko-KR" altLang="en-US" sz="2400" dirty="0" smtClean="0"/>
-              <a:t>기타</a:t>
-            </a:r>
-            <a:endParaRPr lang="en-US" altLang="ko-KR" sz="2400" dirty="0" smtClean="0"/>
-          </a:p>
-          <a:p>
-            <a:endParaRPr lang="ko-KR" altLang="en-US" sz="2400" dirty="0"/>
-          </a:p>
-        </p:txBody>
-      </p:sp>
-    </p:spTree>
-    <p:extLst>
-      <p:ext uri="{BB962C8B-B14F-4D97-AF65-F5344CB8AC3E}">
-        <p14:creationId xmlns:p14="http://schemas.microsoft.com/office/powerpoint/2010/main" val="3380853314"/>
-      </p:ext>
-    </p:extLst>
-  </p:cSld>
-  <p:clrMapOvr>
-    <a:masterClrMapping/>
-  </p:clrMapOvr>
-  <p:timing>
-    <p:tnLst>
-      <p:par>
-        <p:cTn id="1" dur="indefinite" restart="never" nodeType="tmRoot"/>
-      </p:par>
-    </p:tnLst>
-  </p:timing>
-</p:sld>
-</file>
-
-<file path=ppt/slides/slide11.xml><?xml version="1.0" encoding="utf-8"?>
-<p:sld xmlns:a="http://schemas.openxmlformats.org/drawingml/2006/main" xmlns:r="http://schemas.openxmlformats.org/officeDocument/2006/relationships" xmlns:p="http://schemas.openxmlformats.org/presentationml/2006/main">
-  <p:cSld>
-    <p:spTree>
-      <p:nvGrpSpPr>
-        <p:cNvPr id="1" name=""/>
-        <p:cNvGrpSpPr/>
-        <p:nvPr/>
-      </p:nvGrpSpPr>
-      <p:grpSpPr>
-        <a:xfrm>
-          <a:off x="0" y="0"/>
-          <a:ext cx="0" cy="0"/>
-          <a:chOff x="0" y="0"/>
-          <a:chExt cx="0" cy="0"/>
-        </a:xfrm>
-      </p:grpSpPr>
-      <p:sp>
-        <p:nvSpPr>
-          <p:cNvPr id="2" name="제목 1"/>
-          <p:cNvSpPr>
-            <a:spLocks noGrp="1"/>
-          </p:cNvSpPr>
-          <p:nvPr>
             <p:ph type="ctrTitle"/>
           </p:nvPr>
         </p:nvSpPr>
@@ -13926,13 +13800,17 @@
           <a:p>
             <a:r>
               <a:rPr lang="ko-KR" altLang="en-US" sz="2400" dirty="0" smtClean="0"/>
-              <a:t>또한 일정 시간마다 보스 몬스터가 </a:t>
+              <a:t>또한 일정 시간마다 보스 몬스터가 등장해 </a:t>
+            </a:r>
+            <a:r>
+              <a:rPr lang="ko-KR" altLang="en-US" sz="2400" dirty="0" err="1" smtClean="0"/>
+              <a:t>처치시</a:t>
             </a:r>
             <a:r>
               <a:rPr lang="ko-KR" altLang="en-US" sz="2400" dirty="0" smtClean="0"/>
-              <a:t>등장함</a:t>
-            </a:r>
-            <a:endParaRPr lang="en-US" altLang="ko-KR" sz="2400" dirty="0" smtClean="0"/>
+              <a:t> 이로운 효과를 얻을 수 있음</a:t>
+            </a:r>
+            <a:endParaRPr lang="ko-KR" altLang="en-US" sz="2400" dirty="0"/>
           </a:p>
         </p:txBody>
       </p:sp>
@@ -14026,6 +13904,36 @@
           </a:p>
         </p:txBody>
       </p:sp>
+      <p:pic>
+        <p:nvPicPr>
+          <p:cNvPr id="8" name="그림 7"/>
+          <p:cNvPicPr>
+            <a:picLocks noChangeAspect="1"/>
+          </p:cNvPicPr>
+          <p:nvPr/>
+        </p:nvPicPr>
+        <p:blipFill>
+          <a:blip r:embed="rId2" cstate="print">
+            <a:extLst>
+              <a:ext uri="{28A0092B-C50C-407E-A947-70E740481C1C}">
+                <a14:useLocalDpi xmlns:a14="http://schemas.microsoft.com/office/drawing/2010/main" val="0"/>
+              </a:ext>
+            </a:extLst>
+          </a:blip>
+          <a:stretch>
+            <a:fillRect/>
+          </a:stretch>
+        </p:blipFill>
+        <p:spPr>
+          <a:xfrm>
+            <a:off x="-1" y="1664208"/>
+            <a:ext cx="8215951" cy="4700016"/>
+          </a:xfrm>
+          <a:prstGeom prst="rect">
+            <a:avLst/>
+          </a:prstGeom>
+        </p:spPr>
+      </p:pic>
     </p:spTree>
     <p:extLst>
       <p:ext uri="{BB962C8B-B14F-4D97-AF65-F5344CB8AC3E}">
@@ -14178,33 +14086,6 @@
               <a:buFont typeface="Arial" panose="020B0604020202020204" pitchFamily="34" charset="0"/>
               <a:buChar char="•"/>
             </a:pPr>
-            <a:r>
-              <a:rPr lang="en-US" altLang="ko-KR" dirty="0" smtClean="0">
-                <a:solidFill>
-                  <a:schemeClr val="tx2"/>
-                </a:solidFill>
-              </a:rPr>
-              <a:t>UI </a:t>
-            </a:r>
-            <a:r>
-              <a:rPr lang="ko-KR" altLang="en-US" dirty="0" smtClean="0">
-                <a:solidFill>
-                  <a:schemeClr val="tx2"/>
-                </a:solidFill>
-              </a:rPr>
-              <a:t>수정 및 변경</a:t>
-            </a:r>
-            <a:endParaRPr lang="en-US" altLang="ko-KR" dirty="0" smtClean="0">
-              <a:solidFill>
-                <a:schemeClr val="tx2"/>
-              </a:solidFill>
-            </a:endParaRPr>
-          </a:p>
-          <a:p>
-            <a:pPr marL="285750" indent="-285750">
-              <a:buFont typeface="Arial" panose="020B0604020202020204" pitchFamily="34" charset="0"/>
-              <a:buChar char="•"/>
-            </a:pPr>
             <a:endParaRPr lang="ko-KR" altLang="en-US" dirty="0">
               <a:solidFill>
                 <a:schemeClr val="tx2"/>
@@ -14413,12 +14294,20 @@
               <a:buChar char="•"/>
             </a:pPr>
             <a:r>
+              <a:rPr lang="en-US" altLang="ko-KR" dirty="0" smtClean="0">
+                <a:solidFill>
+                  <a:schemeClr val="tx2"/>
+                </a:solidFill>
+              </a:rPr>
+              <a:t>&gt; </a:t>
+            </a:r>
+            <a:r>
               <a:rPr lang="ko-KR" altLang="en-US" dirty="0" smtClean="0">
                 <a:solidFill>
                   <a:schemeClr val="tx2"/>
                 </a:solidFill>
               </a:rPr>
-              <a:t>메인 화면 기능 구현</a:t>
+              <a:t>추가 설명</a:t>
             </a:r>
             <a:endParaRPr lang="ko-KR" altLang="en-US" dirty="0">
               <a:solidFill>
@@ -14715,101 +14604,17 @@
           <a:lstStyle/>
           <a:p>
             <a:r>
-              <a:rPr lang="ko-KR" altLang="en-US" sz="2000" dirty="0" smtClean="0"/>
-              <a:t>메인 화면 </a:t>
-            </a:r>
-            <a:r>
-              <a:rPr lang="en-US" altLang="ko-KR" sz="2000" dirty="0" smtClean="0"/>
-              <a:t>-</a:t>
-            </a:r>
-          </a:p>
-          <a:p>
-            <a:r>
-              <a:rPr lang="ko-KR" altLang="en-US" sz="2000" dirty="0" smtClean="0"/>
-              <a:t>게임 시작 시 닉네임을 입력 후 온라인 서버 리스트로 입장</a:t>
-            </a:r>
-            <a:endParaRPr lang="en-US" altLang="ko-KR" sz="2000" dirty="0" smtClean="0"/>
-          </a:p>
-          <a:p>
-            <a:r>
-              <a:rPr lang="ko-KR" altLang="en-US" sz="2000" dirty="0" smtClean="0"/>
-              <a:t>리스트는 새로 고침이 가능</a:t>
-            </a:r>
-            <a:r>
-              <a:rPr lang="en-US" altLang="ko-KR" sz="2000" dirty="0" smtClean="0"/>
-              <a:t>, </a:t>
-            </a:r>
-            <a:r>
-              <a:rPr lang="ko-KR" altLang="en-US" sz="2000" dirty="0" smtClean="0"/>
-              <a:t>없다면 방 생성 가능</a:t>
-            </a:r>
-            <a:endParaRPr lang="en-US" altLang="ko-KR" sz="2000" dirty="0" smtClean="0"/>
-          </a:p>
-          <a:p>
-            <a:r>
-              <a:rPr lang="ko-KR" altLang="en-US" sz="2000" dirty="0" smtClean="0"/>
-              <a:t>볼륨 조절 설정 창과 </a:t>
-            </a:r>
-            <a:r>
-              <a:rPr lang="en-US" altLang="ko-KR" sz="2000" dirty="0" smtClean="0"/>
-              <a:t>SFX </a:t>
-            </a:r>
-            <a:r>
-              <a:rPr lang="ko-KR" altLang="en-US" sz="2000" dirty="0" smtClean="0"/>
-              <a:t>조절 설정 창이 존재</a:t>
-            </a:r>
-            <a:endParaRPr lang="ko-KR" altLang="en-US" sz="2000" dirty="0"/>
-          </a:p>
-        </p:txBody>
-      </p:sp>
-      <p:pic>
-        <p:nvPicPr>
-          <p:cNvPr id="8" name="그림 7"/>
-          <p:cNvPicPr>
-            <a:picLocks noChangeAspect="1"/>
-          </p:cNvPicPr>
-          <p:nvPr/>
-        </p:nvPicPr>
-        <p:blipFill>
-          <a:blip r:embed="rId2"/>
-          <a:stretch>
-            <a:fillRect/>
-          </a:stretch>
-        </p:blipFill>
-        <p:spPr>
-          <a:xfrm>
-            <a:off x="7451678" y="1252728"/>
-            <a:ext cx="4740322" cy="4873752"/>
-          </a:xfrm>
-          <a:prstGeom prst="rect">
-            <a:avLst/>
-          </a:prstGeom>
-        </p:spPr>
-      </p:pic>
-      <p:pic>
-        <p:nvPicPr>
-          <p:cNvPr id="9" name="그림 8"/>
-          <p:cNvPicPr>
-            <a:picLocks noChangeAspect="1"/>
-          </p:cNvPicPr>
-          <p:nvPr/>
-        </p:nvPicPr>
-        <p:blipFill>
-          <a:blip r:embed="rId3"/>
-          <a:stretch>
-            <a:fillRect/>
-          </a:stretch>
-        </p:blipFill>
-        <p:spPr>
-          <a:xfrm>
-            <a:off x="609600" y="3342784"/>
-            <a:ext cx="6344535" cy="2783696"/>
-          </a:xfrm>
-          <a:prstGeom prst="rect">
-            <a:avLst/>
-          </a:prstGeom>
-        </p:spPr>
-      </p:pic>
+              <a:rPr lang="ko-KR" altLang="en-US" sz="2400" dirty="0" smtClean="0"/>
+              <a:t>완성도가 높은 기능</a:t>
+            </a:r>
+            <a:r>
+              <a:rPr lang="en-US" altLang="ko-KR" sz="2400" dirty="0" smtClean="0"/>
+              <a:t>1</a:t>
+            </a:r>
+            <a:endParaRPr lang="ko-KR" altLang="en-US" sz="2400" dirty="0"/>
+          </a:p>
+        </p:txBody>
+      </p:sp>
     </p:spTree>
     <p:extLst>
       <p:ext uri="{BB962C8B-B14F-4D97-AF65-F5344CB8AC3E}">
@@ -14899,12 +14704,7 @@
             <p:ph idx="1"/>
           </p:nvPr>
         </p:nvSpPr>
-        <p:spPr>
-          <a:xfrm>
-            <a:off x="609599" y="1527048"/>
-            <a:ext cx="4003344" cy="4599432"/>
-          </a:xfrm>
-        </p:spPr>
+        <p:spPr/>
         <p:txBody>
           <a:bodyPr>
             <a:normAutofit/>
@@ -14912,96 +14712,17 @@
           <a:lstStyle/>
           <a:p>
             <a:r>
-              <a:rPr lang="ko-KR" altLang="en-US" sz="2000" dirty="0" smtClean="0"/>
-              <a:t>플레이 </a:t>
-            </a:r>
-            <a:r>
-              <a:rPr lang="en-US" altLang="ko-KR" sz="2000" dirty="0" smtClean="0"/>
-              <a:t>– 1</a:t>
-            </a:r>
-          </a:p>
-          <a:p>
-            <a:r>
-              <a:rPr lang="ko-KR" altLang="en-US" sz="2000" dirty="0"/>
-              <a:t>멀티 플레이로 다른 사람들과 </a:t>
-            </a:r>
-            <a:r>
-              <a:rPr lang="ko-KR" altLang="en-US" sz="2000" dirty="0" smtClean="0"/>
-              <a:t>함께 플레이 가능</a:t>
-            </a:r>
-            <a:endParaRPr lang="en-US" altLang="ko-KR" sz="2000" dirty="0" smtClean="0"/>
-          </a:p>
-          <a:p>
-            <a:r>
-              <a:rPr lang="ko-KR" altLang="en-US" sz="2000" dirty="0" smtClean="0"/>
-              <a:t>일정 시간마다 특정 구역 안에서 좀비가 계속 생성</a:t>
-            </a:r>
-            <a:endParaRPr lang="en-US" altLang="ko-KR" sz="2000" dirty="0" smtClean="0"/>
-          </a:p>
-          <a:p>
-            <a:r>
-              <a:rPr lang="ko-KR" altLang="en-US" sz="2000" dirty="0" smtClean="0"/>
-              <a:t>좀비의 종류가 다양함</a:t>
-            </a:r>
-            <a:endParaRPr lang="en-US" altLang="ko-KR" sz="2000" dirty="0" smtClean="0"/>
-          </a:p>
-          <a:p>
-            <a:r>
-              <a:rPr lang="ko-KR" altLang="en-US" sz="2000" dirty="0" smtClean="0"/>
-              <a:t>화면 우측 상단에 </a:t>
-            </a:r>
-            <a:r>
-              <a:rPr lang="ko-KR" altLang="en-US" sz="2000" dirty="0" err="1" smtClean="0"/>
-              <a:t>미니맵으로</a:t>
-            </a:r>
-            <a:r>
-              <a:rPr lang="ko-KR" altLang="en-US" sz="2000" dirty="0" smtClean="0"/>
-              <a:t> 플레이어</a:t>
-            </a:r>
-            <a:r>
-              <a:rPr lang="en-US" altLang="ko-KR" sz="2000" dirty="0" smtClean="0"/>
-              <a:t>/</a:t>
-            </a:r>
-            <a:r>
-              <a:rPr lang="ko-KR" altLang="en-US" sz="2000" dirty="0" smtClean="0"/>
-              <a:t>적 위치 확인 가능</a:t>
-            </a:r>
-            <a:r>
-              <a:rPr lang="en-US" altLang="ko-KR" sz="2000" dirty="0" smtClean="0"/>
-              <a:t>, </a:t>
-            </a:r>
-            <a:r>
-              <a:rPr lang="ko-KR" altLang="en-US" sz="2000" dirty="0" smtClean="0"/>
-              <a:t>플레이어 기준으로 움직임</a:t>
-            </a:r>
-            <a:endParaRPr lang="en-US" altLang="ko-KR" sz="2000" dirty="0" smtClean="0"/>
-          </a:p>
-        </p:txBody>
-      </p:sp>
-      <p:pic>
-        <p:nvPicPr>
-          <p:cNvPr id="5" name="그림 4"/>
-          <p:cNvPicPr>
-            <a:picLocks noChangeAspect="1"/>
-          </p:cNvPicPr>
-          <p:nvPr/>
-        </p:nvPicPr>
-        <p:blipFill>
-          <a:blip r:embed="rId2"/>
-          <a:stretch>
-            <a:fillRect/>
-          </a:stretch>
-        </p:blipFill>
-        <p:spPr>
-          <a:xfrm>
-            <a:off x="4612942" y="1771650"/>
-            <a:ext cx="7579058" cy="4354830"/>
-          </a:xfrm>
-          <a:prstGeom prst="rect">
-            <a:avLst/>
-          </a:prstGeom>
-        </p:spPr>
-      </p:pic>
+              <a:rPr lang="ko-KR" altLang="en-US" sz="2400" dirty="0" smtClean="0"/>
+              <a:t>완성도가 높은 기능</a:t>
+            </a:r>
+            <a:r>
+              <a:rPr lang="en-US" altLang="ko-KR" sz="2400" dirty="0" smtClean="0"/>
+              <a:t>2</a:t>
+            </a:r>
+            <a:endParaRPr lang="ko-KR" altLang="en-US" sz="2400" dirty="0"/>
+          </a:p>
+        </p:txBody>
+      </p:sp>
     </p:spTree>
     <p:extLst>
       <p:ext uri="{BB962C8B-B14F-4D97-AF65-F5344CB8AC3E}">
@@ -15091,12 +14812,7 @@
             <p:ph idx="1"/>
           </p:nvPr>
         </p:nvSpPr>
-        <p:spPr>
-          <a:xfrm>
-            <a:off x="609600" y="1527048"/>
-            <a:ext cx="4276299" cy="4599432"/>
-          </a:xfrm>
-        </p:spPr>
+        <p:spPr/>
         <p:txBody>
           <a:bodyPr>
             <a:normAutofit/>
@@ -15104,62 +14820,14 @@
           <a:lstStyle/>
           <a:p>
             <a:r>
-              <a:rPr lang="ko-KR" altLang="en-US" sz="2000" dirty="0" smtClean="0"/>
-              <a:t>플레이 </a:t>
-            </a:r>
-            <a:r>
-              <a:rPr lang="en-US" altLang="ko-KR" sz="2000" dirty="0" smtClean="0"/>
-              <a:t>– 2</a:t>
-            </a:r>
-          </a:p>
-          <a:p>
-            <a:r>
-              <a:rPr lang="ko-KR" altLang="en-US" sz="2000" dirty="0" smtClean="0"/>
-              <a:t>좀비 각각 애니메이션이</a:t>
-            </a:r>
-            <a:r>
-              <a:rPr lang="en-US" altLang="ko-KR" sz="2000" dirty="0"/>
-              <a:t> </a:t>
-            </a:r>
-            <a:r>
-              <a:rPr lang="ko-KR" altLang="en-US" sz="2000" dirty="0" smtClean="0"/>
-              <a:t>다름</a:t>
-            </a:r>
-            <a:endParaRPr lang="en-US" altLang="ko-KR" sz="2000" dirty="0" smtClean="0"/>
-          </a:p>
-          <a:p>
-            <a:r>
-              <a:rPr lang="ko-KR" altLang="en-US" sz="2000" dirty="0" err="1" smtClean="0"/>
-              <a:t>맵에</a:t>
-            </a:r>
-            <a:r>
-              <a:rPr lang="ko-KR" altLang="en-US" sz="2000" dirty="0" smtClean="0"/>
-              <a:t> </a:t>
-            </a:r>
-            <a:r>
-              <a:rPr lang="ko-KR" altLang="en-US" sz="2000" dirty="0" err="1" smtClean="0"/>
-              <a:t>클리어</a:t>
-            </a:r>
-            <a:r>
-              <a:rPr lang="ko-KR" altLang="en-US" sz="2000" dirty="0" smtClean="0"/>
-              <a:t> 존이 존재</a:t>
-            </a:r>
-            <a:r>
-              <a:rPr lang="en-US" altLang="ko-KR" sz="2000" dirty="0" smtClean="0"/>
-              <a:t>, </a:t>
-            </a:r>
-            <a:r>
-              <a:rPr lang="ko-KR" altLang="en-US" sz="2000" dirty="0" smtClean="0"/>
-              <a:t>그곳으로 가면 게임 </a:t>
-            </a:r>
-            <a:r>
-              <a:rPr lang="ko-KR" altLang="en-US" sz="2000" dirty="0" err="1" smtClean="0"/>
-              <a:t>클리어</a:t>
-            </a:r>
-            <a:endParaRPr lang="en-US" altLang="ko-KR" sz="2000" dirty="0" smtClean="0"/>
-          </a:p>
-          <a:p>
-            <a:endParaRPr lang="ko-KR" altLang="en-US" sz="2000" dirty="0"/>
+              <a:rPr lang="ko-KR" altLang="en-US" sz="2400" dirty="0" smtClean="0"/>
+              <a:t>완성도가 높은 기능</a:t>
+            </a:r>
+            <a:r>
+              <a:rPr lang="en-US" altLang="ko-KR" sz="2400" dirty="0" smtClean="0"/>
+              <a:t>3</a:t>
+            </a:r>
+            <a:endParaRPr lang="ko-KR" altLang="en-US" sz="2400" dirty="0"/>
           </a:p>
         </p:txBody>
       </p:sp>
@@ -15243,46 +14911,17 @@
         </p:nvSpPr>
         <p:spPr/>
         <p:txBody>
-          <a:bodyPr>
-            <a:normAutofit/>
-          </a:bodyPr>
-          <a:lstStyle/>
-          <a:p>
-            <a:pPr marL="0" indent="0">
-              <a:buNone/>
-            </a:pPr>
-            <a:r>
-              <a:rPr lang="ko-KR" altLang="en-US" sz="2000" dirty="0" smtClean="0"/>
-              <a:t>멀티플레이 캐릭터 움직임 코드</a:t>
-            </a:r>
-            <a:endParaRPr lang="ko-KR" altLang="en-US" sz="2000" dirty="0"/>
-          </a:p>
-        </p:txBody>
-      </p:sp>
-      <p:pic>
-        <p:nvPicPr>
-          <p:cNvPr id="7" name="그림 6"/>
-          <p:cNvPicPr>
-            <a:picLocks noChangeAspect="1"/>
-          </p:cNvPicPr>
-          <p:nvPr/>
-        </p:nvPicPr>
-        <p:blipFill>
-          <a:blip r:embed="rId2"/>
-          <a:stretch>
-            <a:fillRect/>
-          </a:stretch>
-        </p:blipFill>
-        <p:spPr>
-          <a:xfrm>
-            <a:off x="4258101" y="1527048"/>
-            <a:ext cx="7324300" cy="4599432"/>
-          </a:xfrm>
-          <a:prstGeom prst="rect">
-            <a:avLst/>
-          </a:prstGeom>
-        </p:spPr>
-      </p:pic>
+          <a:bodyPr/>
+          <a:lstStyle/>
+          <a:p>
+            <a:r>
+              <a:rPr lang="ko-KR" altLang="en-US" dirty="0" smtClean="0"/>
+              <a:t>코드 사진</a:t>
+            </a:r>
+            <a:endParaRPr lang="ko-KR" altLang="en-US" dirty="0"/>
+          </a:p>
+        </p:txBody>
+      </p:sp>
     </p:spTree>
     <p:extLst>
       <p:ext uri="{BB962C8B-B14F-4D97-AF65-F5344CB8AC3E}">
@@ -15332,101 +14971,86 @@
         </p:nvSpPr>
         <p:spPr/>
         <p:txBody>
-          <a:bodyPr/>
-          <a:lstStyle/>
-          <a:p>
-            <a:r>
-              <a:rPr lang="ko-KR" altLang="en-US" b="1" dirty="0" smtClean="0">
+          <a:bodyPr>
+            <a:normAutofit/>
+          </a:bodyPr>
+          <a:lstStyle/>
+          <a:p>
+            <a:r>
+              <a:rPr lang="ko-KR" altLang="en-US" sz="3200" b="1" dirty="0" smtClean="0">
                 <a:solidFill>
                   <a:schemeClr val="tx2"/>
                 </a:solidFill>
+                <a:latin typeface="+mj-ea"/>
               </a:rPr>
-              <a:t>핵심 코드 소스</a:t>
-            </a:r>
-            <a:endParaRPr lang="ko-KR" altLang="en-US" b="1" dirty="0">
+              <a:t>만드는데 겪었던 어려움</a:t>
+            </a:r>
+            <a:r>
+              <a:rPr lang="en-US" altLang="ko-KR" sz="3200" b="1" dirty="0" smtClean="0">
+                <a:solidFill>
+                  <a:schemeClr val="tx2"/>
+                </a:solidFill>
+                <a:latin typeface="+mj-ea"/>
+              </a:rPr>
+              <a:t>, </a:t>
+            </a:r>
+            <a:r>
+              <a:rPr lang="ko-KR" altLang="en-US" sz="3200" b="1" dirty="0" smtClean="0">
+                <a:solidFill>
+                  <a:schemeClr val="tx2"/>
+                </a:solidFill>
+                <a:latin typeface="+mj-ea"/>
+              </a:rPr>
+              <a:t>해결 방법</a:t>
+            </a:r>
+            <a:endParaRPr lang="ko-KR" altLang="en-US" sz="3200" b="1" dirty="0">
               <a:solidFill>
                 <a:schemeClr val="tx2"/>
               </a:solidFill>
+              <a:latin typeface="+mj-ea"/>
             </a:endParaRPr>
           </a:p>
         </p:txBody>
       </p:sp>
-      <p:pic>
-        <p:nvPicPr>
-          <p:cNvPr id="3" name="내용 개체 틀 2"/>
-          <p:cNvPicPr>
-            <a:picLocks noGrp="1" noChangeAspect="1"/>
-          </p:cNvPicPr>
+      <p:sp>
+        <p:nvSpPr>
+          <p:cNvPr id="4" name="내용 개체 틀 3"/>
+          <p:cNvSpPr>
+            <a:spLocks noGrp="1"/>
+          </p:cNvSpPr>
           <p:nvPr>
             <p:ph idx="1"/>
           </p:nvPr>
-        </p:nvPicPr>
-        <p:blipFill>
-          <a:blip r:embed="rId2"/>
-          <a:stretch>
-            <a:fillRect/>
-          </a:stretch>
-        </p:blipFill>
-        <p:spPr>
-          <a:xfrm>
-            <a:off x="0" y="1527174"/>
-            <a:ext cx="12191999" cy="5330825"/>
-          </a:xfrm>
-          <a:prstGeom prst="rect">
-            <a:avLst/>
-          </a:prstGeom>
-        </p:spPr>
-      </p:pic>
-      <p:sp>
-        <p:nvSpPr>
-          <p:cNvPr id="5" name="TextBox 4"/>
-          <p:cNvSpPr txBox="1"/>
-          <p:nvPr/>
-        </p:nvSpPr>
-        <p:spPr>
-          <a:xfrm>
-            <a:off x="0" y="1157842"/>
-            <a:ext cx="2805576" cy="369332"/>
-          </a:xfrm>
-          <a:prstGeom prst="rect">
-            <a:avLst/>
-          </a:prstGeom>
-          <a:noFill/>
-        </p:spPr>
-        <p:txBody>
-          <a:bodyPr wrap="none" rtlCol="0">
-            <a:spAutoFit/>
+        </p:nvSpPr>
+        <p:spPr/>
+        <p:txBody>
+          <a:bodyPr>
+            <a:normAutofit/>
           </a:bodyPr>
           <a:lstStyle/>
           <a:p>
             <a:r>
-              <a:rPr lang="ko-KR" altLang="en-US" dirty="0" smtClean="0"/>
-              <a:t>적</a:t>
-            </a:r>
-            <a:r>
-              <a:rPr lang="en-US" altLang="ko-KR" dirty="0" smtClean="0"/>
-              <a:t>(</a:t>
-            </a:r>
-            <a:r>
-              <a:rPr lang="ko-KR" altLang="en-US" dirty="0" smtClean="0"/>
-              <a:t>좀비</a:t>
-            </a:r>
-            <a:r>
-              <a:rPr lang="en-US" altLang="ko-KR" dirty="0" smtClean="0"/>
-              <a:t>)</a:t>
-            </a:r>
-            <a:r>
-              <a:rPr lang="ko-KR" altLang="en-US" dirty="0" smtClean="0"/>
-              <a:t> 움직임 코드 소스</a:t>
-            </a:r>
-            <a:endParaRPr lang="ko-KR" altLang="en-US" dirty="0"/>
+              <a:rPr lang="ko-KR" altLang="en-US" sz="2400" dirty="0" smtClean="0"/>
+              <a:t>네트워크 관련</a:t>
+            </a:r>
+            <a:endParaRPr lang="en-US" altLang="ko-KR" sz="2400" dirty="0" smtClean="0"/>
+          </a:p>
+          <a:p>
+            <a:r>
+              <a:rPr lang="ko-KR" altLang="en-US" sz="2400" dirty="0" smtClean="0"/>
+              <a:t>기타</a:t>
+            </a:r>
+            <a:endParaRPr lang="en-US" altLang="ko-KR" sz="2400" dirty="0" smtClean="0"/>
+          </a:p>
+          <a:p>
+            <a:endParaRPr lang="ko-KR" altLang="en-US" sz="2400" dirty="0"/>
           </a:p>
         </p:txBody>
       </p:sp>
     </p:spTree>
     <p:extLst>
       <p:ext uri="{BB962C8B-B14F-4D97-AF65-F5344CB8AC3E}">
-        <p14:creationId xmlns:p14="http://schemas.microsoft.com/office/powerpoint/2010/main" val="3920896334"/>
+        <p14:creationId xmlns:p14="http://schemas.microsoft.com/office/powerpoint/2010/main" val="3380853314"/>
       </p:ext>
     </p:extLst>
   </p:cSld>

</xml_diff>